<commit_message>
Edited Chapter 2 of Lit Review
</commit_message>
<xml_diff>
--- a/Research_Project/Analysis Proposal for Bd_Ksta0gg.pptx
+++ b/Research_Project/Analysis Proposal for Bd_Ksta0gg.pptx
@@ -201,7 +201,7 @@
           <a:p>
             <a:fld id="{F43C0194-EF11-432C-8CFC-56174A6DDA2B}" type="datetimeFigureOut">
               <a:rPr lang="en-AU" smtClean="0"/>
-              <a:t>3/02/2023</a:t>
+              <a:t>8/02/2023</a:t>
             </a:fld>
             <a:endParaRPr lang="en-AU"/>
           </a:p>
@@ -932,7 +932,7 @@
           <a:p>
             <a:fld id="{BBD7BE69-4EDB-47CF-9116-6C3B9D83ABE4}" type="datetime1">
               <a:rPr lang="en-AU" smtClean="0"/>
-              <a:t>3/02/2023</a:t>
+              <a:t>8/02/2023</a:t>
             </a:fld>
             <a:endParaRPr lang="en-AU"/>
           </a:p>
@@ -1132,7 +1132,7 @@
           <a:p>
             <a:fld id="{6775FD14-3C15-443F-AAFF-74FF62A63B78}" type="datetime1">
               <a:rPr lang="en-AU" smtClean="0"/>
-              <a:t>3/02/2023</a:t>
+              <a:t>8/02/2023</a:t>
             </a:fld>
             <a:endParaRPr lang="en-AU"/>
           </a:p>
@@ -1342,7 +1342,7 @@
           <a:p>
             <a:fld id="{A1233859-7FEF-4674-91DC-195B9C3855F4}" type="datetime1">
               <a:rPr lang="en-AU" smtClean="0"/>
-              <a:t>3/02/2023</a:t>
+              <a:t>8/02/2023</a:t>
             </a:fld>
             <a:endParaRPr lang="en-AU"/>
           </a:p>
@@ -1542,7 +1542,7 @@
           <a:p>
             <a:fld id="{768D4814-2386-49FC-B51F-074219F49A44}" type="datetime1">
               <a:rPr lang="en-AU" smtClean="0"/>
-              <a:t>3/02/2023</a:t>
+              <a:t>8/02/2023</a:t>
             </a:fld>
             <a:endParaRPr lang="en-AU"/>
           </a:p>
@@ -1818,7 +1818,7 @@
           <a:p>
             <a:fld id="{9B5C96FF-A91D-47A7-92B1-786FEB997134}" type="datetime1">
               <a:rPr lang="en-AU" smtClean="0"/>
-              <a:t>3/02/2023</a:t>
+              <a:t>8/02/2023</a:t>
             </a:fld>
             <a:endParaRPr lang="en-AU"/>
           </a:p>
@@ -2086,7 +2086,7 @@
           <a:p>
             <a:fld id="{57ED2A3D-55B5-42B7-9502-0D25E1BCCC28}" type="datetime1">
               <a:rPr lang="en-AU" smtClean="0"/>
-              <a:t>3/02/2023</a:t>
+              <a:t>8/02/2023</a:t>
             </a:fld>
             <a:endParaRPr lang="en-AU"/>
           </a:p>
@@ -2501,7 +2501,7 @@
           <a:p>
             <a:fld id="{78890572-0CA6-43BB-8DE3-B54E7743ACBC}" type="datetime1">
               <a:rPr lang="en-AU" smtClean="0"/>
-              <a:t>3/02/2023</a:t>
+              <a:t>8/02/2023</a:t>
             </a:fld>
             <a:endParaRPr lang="en-AU"/>
           </a:p>
@@ -2643,7 +2643,7 @@
           <a:p>
             <a:fld id="{14728B24-AD14-4FB8-87DA-6B2A5855EA3B}" type="datetime1">
               <a:rPr lang="en-AU" smtClean="0"/>
-              <a:t>3/02/2023</a:t>
+              <a:t>8/02/2023</a:t>
             </a:fld>
             <a:endParaRPr lang="en-AU"/>
           </a:p>
@@ -2756,7 +2756,7 @@
           <a:p>
             <a:fld id="{C2E784F3-245E-4CC4-B981-D113D03264A2}" type="datetime1">
               <a:rPr lang="en-AU" smtClean="0"/>
-              <a:t>3/02/2023</a:t>
+              <a:t>8/02/2023</a:t>
             </a:fld>
             <a:endParaRPr lang="en-AU"/>
           </a:p>
@@ -3069,7 +3069,7 @@
           <a:p>
             <a:fld id="{78C02812-D3B3-405D-9EA6-0975152703DC}" type="datetime1">
               <a:rPr lang="en-AU" smtClean="0"/>
-              <a:t>3/02/2023</a:t>
+              <a:t>8/02/2023</a:t>
             </a:fld>
             <a:endParaRPr lang="en-AU"/>
           </a:p>
@@ -3358,7 +3358,7 @@
           <a:p>
             <a:fld id="{1902B1CE-A1C5-4661-AA5F-697886BA2232}" type="datetime1">
               <a:rPr lang="en-AU" smtClean="0"/>
-              <a:t>3/02/2023</a:t>
+              <a:t>8/02/2023</a:t>
             </a:fld>
             <a:endParaRPr lang="en-AU"/>
           </a:p>
@@ -3601,7 +3601,7 @@
           <a:p>
             <a:fld id="{E32D636E-242A-4980-BD7D-3C985250BE4D}" type="datetime1">
               <a:rPr lang="en-AU" smtClean="0"/>
-              <a:t>3/02/2023</a:t>
+              <a:t>8/02/2023</a:t>
             </a:fld>
             <a:endParaRPr lang="en-AU"/>
           </a:p>
@@ -4019,8 +4019,8 @@
           <a:chExt cx="0" cy="0"/>
         </a:xfrm>
       </p:grpSpPr>
-      <mc:AlternateContent xmlns:mc="http://schemas.openxmlformats.org/markup-compatibility/2006">
-        <mc:Choice xmlns:a14="http://schemas.microsoft.com/office/drawing/2010/main" Requires="a14">
+      <mc:AlternateContent xmlns:mc="http://schemas.openxmlformats.org/markup-compatibility/2006" xmlns:a14="http://schemas.microsoft.com/office/drawing/2010/main">
+        <mc:Choice Requires="a14">
           <p:sp>
             <p:nvSpPr>
               <p:cNvPr id="2" name="Title 1">
@@ -4198,7 +4198,7 @@
             </p:txBody>
           </p:sp>
         </mc:Choice>
-        <mc:Fallback>
+        <mc:Fallback xmlns="">
           <p:sp>
             <p:nvSpPr>
               <p:cNvPr id="2" name="Title 1">
@@ -5336,7 +5336,12 @@
             <p:ph type="title"/>
           </p:nvPr>
         </p:nvSpPr>
-        <p:spPr/>
+        <p:spPr>
+          <a:xfrm>
+            <a:off x="802690" y="164160"/>
+            <a:ext cx="10515600" cy="1325563"/>
+          </a:xfrm>
+        </p:spPr>
         <p:txBody>
           <a:bodyPr/>
           <a:lstStyle/>
@@ -5348,8 +5353,8 @@
           </a:p>
         </p:txBody>
       </p:sp>
-      <mc:AlternateContent xmlns:mc="http://schemas.openxmlformats.org/markup-compatibility/2006">
-        <mc:Choice xmlns:a14="http://schemas.microsoft.com/office/drawing/2010/main" Requires="a14">
+      <mc:AlternateContent xmlns:mc="http://schemas.openxmlformats.org/markup-compatibility/2006" xmlns:a14="http://schemas.microsoft.com/office/drawing/2010/main">
+        <mc:Choice Requires="a14">
           <p:sp>
             <p:nvSpPr>
               <p:cNvPr id="3" name="Content Placeholder 2">
@@ -5368,7 +5373,7 @@
             </p:nvSpPr>
             <p:spPr>
               <a:xfrm>
-                <a:off x="744893" y="1489723"/>
+                <a:off x="707571" y="1349764"/>
                 <a:ext cx="10515600" cy="4351338"/>
               </a:xfrm>
             </p:spPr>
@@ -5377,13 +5382,13 @@
               <a:lstStyle/>
               <a:p>
                 <a:r>
-                  <a:rPr lang="en-AU" dirty="0"/>
+                  <a:rPr lang="en-AU" sz="2400" dirty="0"/>
                   <a:t>Preliminary studies to look at how events will survive EM trigger in Run 2 data</a:t>
                 </a:r>
               </a:p>
               <a:p>
                 <a:r>
-                  <a:rPr lang="en-AU" dirty="0"/>
+                  <a:rPr lang="en-AU" sz="2400" dirty="0"/>
                   <a:t>Seek to determine how </a:t>
                 </a:r>
                 <a14:m>
@@ -5391,14 +5396,14 @@
                     <m:sSubSup>
                       <m:sSubSupPr>
                         <m:ctrlPr>
-                          <a:rPr lang="en-AU" b="0" i="1" smtClean="0">
+                          <a:rPr lang="en-AU" sz="2400" b="0" i="1" smtClean="0">
                             <a:latin typeface="Cambria Math" panose="02040503050406030204" pitchFamily="18" charset="0"/>
                           </a:rPr>
                         </m:ctrlPr>
                       </m:sSubSupPr>
                       <m:e>
                         <m:r>
-                          <a:rPr lang="en-AU" b="0" i="1" smtClean="0">
+                          <a:rPr lang="en-AU" sz="2400" b="0" i="1" smtClean="0">
                             <a:latin typeface="Cambria Math" panose="02040503050406030204" pitchFamily="18" charset="0"/>
                           </a:rPr>
                           <m:t>𝜀</m:t>
@@ -5406,7 +5411,7 @@
                       </m:e>
                       <m:sub>
                         <m:r>
-                          <a:rPr lang="en-AU" b="0" i="1" smtClean="0">
+                          <a:rPr lang="en-AU" sz="2400" b="0" i="1" smtClean="0">
                             <a:latin typeface="Cambria Math" panose="02040503050406030204" pitchFamily="18" charset="0"/>
                           </a:rPr>
                           <m:t>𝑠𝑒𝑙</m:t>
@@ -5414,7 +5419,7 @@
                       </m:sub>
                       <m:sup>
                         <m:r>
-                          <a:rPr lang="en-AU" b="0" i="1" smtClean="0">
+                          <a:rPr lang="en-AU" sz="2400" b="0" i="1" smtClean="0">
                             <a:latin typeface="Cambria Math" panose="02040503050406030204" pitchFamily="18" charset="0"/>
                           </a:rPr>
                           <m:t>𝛾𝛾</m:t>
@@ -5424,25 +5429,25 @@
                   </m:oMath>
                 </a14:m>
                 <a:r>
-                  <a:rPr lang="en-AU" dirty="0"/>
+                  <a:rPr lang="en-AU" sz="2400" dirty="0"/>
                   <a:t> varies as a function of ALP mass</a:t>
                 </a:r>
               </a:p>
               <a:p>
                 <a:r>
-                  <a:rPr lang="en-AU" dirty="0"/>
+                  <a:rPr lang="en-AU" sz="2400" dirty="0"/>
                   <a:t>Will determine if efficiency using </a:t>
                 </a:r>
                 <a14:m>
                   <m:oMath xmlns:m="http://schemas.openxmlformats.org/officeDocument/2006/math">
                     <m:r>
-                      <a:rPr lang="en-AU" b="0" i="1" smtClean="0">
+                      <a:rPr lang="en-AU" sz="2400" b="0" i="1" smtClean="0">
                         <a:latin typeface="Cambria Math" panose="02040503050406030204" pitchFamily="18" charset="0"/>
                       </a:rPr>
                       <m:t>𝐵</m:t>
                     </m:r>
                     <m:r>
-                      <a:rPr lang="en-AU" b="0" i="1" smtClean="0">
+                      <a:rPr lang="en-AU" sz="2400" b="0" i="1" smtClean="0">
                         <a:latin typeface="Cambria Math" panose="02040503050406030204" pitchFamily="18" charset="0"/>
                       </a:rPr>
                       <m:t>→</m:t>
@@ -5450,14 +5455,14 @@
                     <m:sSup>
                       <m:sSupPr>
                         <m:ctrlPr>
-                          <a:rPr lang="en-AU" b="0" i="1" smtClean="0">
+                          <a:rPr lang="en-AU" sz="2400" b="0" i="1" smtClean="0">
                             <a:latin typeface="Cambria Math" panose="02040503050406030204" pitchFamily="18" charset="0"/>
                           </a:rPr>
                         </m:ctrlPr>
                       </m:sSupPr>
                       <m:e>
                         <m:r>
-                          <a:rPr lang="en-AU" b="0" i="1" smtClean="0">
+                          <a:rPr lang="en-AU" sz="2400" b="0" i="1" smtClean="0">
                             <a:latin typeface="Cambria Math" panose="02040503050406030204" pitchFamily="18" charset="0"/>
                           </a:rPr>
                           <m:t>𝐾</m:t>
@@ -5465,7 +5470,7 @@
                       </m:e>
                       <m:sup>
                         <m:r>
-                          <a:rPr lang="en-AU" b="0" i="1" smtClean="0">
+                          <a:rPr lang="en-AU" sz="2400" b="0" i="1" smtClean="0">
                             <a:latin typeface="Cambria Math" panose="02040503050406030204" pitchFamily="18" charset="0"/>
                           </a:rPr>
                           <m:t>∗</m:t>
@@ -5473,7 +5478,7 @@
                       </m:sup>
                     </m:sSup>
                     <m:r>
-                      <a:rPr lang="en-AU" b="0" i="1" smtClean="0">
+                      <a:rPr lang="en-AU" sz="2400" b="0" i="1" smtClean="0">
                         <a:latin typeface="Cambria Math" panose="02040503050406030204" pitchFamily="18" charset="0"/>
                       </a:rPr>
                       <m:t>𝛾</m:t>
@@ -5481,8 +5486,66 @@
                   </m:oMath>
                 </a14:m>
                 <a:r>
-                  <a:rPr lang="en-AU" dirty="0"/>
+                  <a:rPr lang="en-AU" sz="2400" dirty="0"/>
                   <a:t> stripping is high enough to make an analysis for Run 1 and 2. Otherwise aim at Run 3. </a:t>
+                </a:r>
+              </a:p>
+              <a:p>
+                <a:r>
+                  <a:rPr lang="en-AU" sz="2400" dirty="0"/>
+                  <a:t>Work in progress: Requested simulated data for </a:t>
+                </a:r>
+                <a14:m>
+                  <m:oMath xmlns:m="http://schemas.openxmlformats.org/officeDocument/2006/math">
+                    <m:sSub>
+                      <m:sSubPr>
+                        <m:ctrlPr>
+                          <a:rPr lang="en-AU" sz="2400" b="0" i="1" smtClean="0">
+                            <a:latin typeface="Cambria Math" panose="02040503050406030204" pitchFamily="18" charset="0"/>
+                          </a:rPr>
+                        </m:ctrlPr>
+                      </m:sSubPr>
+                      <m:e>
+                        <m:r>
+                          <a:rPr lang="en-AU" sz="2400" b="0" i="1" smtClean="0">
+                            <a:latin typeface="Cambria Math" panose="02040503050406030204" pitchFamily="18" charset="0"/>
+                          </a:rPr>
+                          <m:t>𝑚</m:t>
+                        </m:r>
+                      </m:e>
+                      <m:sub>
+                        <m:sSub>
+                          <m:sSubPr>
+                            <m:ctrlPr>
+                              <a:rPr lang="en-AU" sz="2400" b="0" i="1" smtClean="0">
+                                <a:latin typeface="Cambria Math" panose="02040503050406030204" pitchFamily="18" charset="0"/>
+                              </a:rPr>
+                            </m:ctrlPr>
+                          </m:sSubPr>
+                          <m:e>
+                            <m:r>
+                              <a:rPr lang="en-AU" sz="2400" b="0" i="1" smtClean="0">
+                                <a:latin typeface="Cambria Math" panose="02040503050406030204" pitchFamily="18" charset="0"/>
+                              </a:rPr>
+                              <m:t>𝑎</m:t>
+                            </m:r>
+                          </m:e>
+                          <m:sub>
+                            <m:r>
+                              <a:rPr lang="en-AU" sz="2400" b="0" i="1" smtClean="0">
+                                <a:latin typeface="Cambria Math" panose="02040503050406030204" pitchFamily="18" charset="0"/>
+                              </a:rPr>
+                              <m:t>0</m:t>
+                            </m:r>
+                          </m:sub>
+                        </m:sSub>
+                      </m:sub>
+                    </m:sSub>
+                  </m:oMath>
+                </a14:m>
+                <a:r>
+                  <a:rPr lang="en-AU" sz="2400" dirty="0"/>
+                  <a:t>= 0.180, 1, and 3 GeV. </a:t>
                 </a:r>
               </a:p>
               <a:p>
@@ -5494,7 +5557,7 @@
             </p:txBody>
           </p:sp>
         </mc:Choice>
-        <mc:Fallback>
+        <mc:Fallback xmlns="">
           <p:sp>
             <p:nvSpPr>
               <p:cNvPr id="3" name="Content Placeholder 2">
@@ -5513,13 +5576,13 @@
             </p:nvSpPr>
             <p:spPr>
               <a:xfrm>
-                <a:off x="744893" y="1489723"/>
+                <a:off x="707571" y="1349764"/>
                 <a:ext cx="10515600" cy="4351338"/>
               </a:xfrm>
               <a:blipFill>
                 <a:blip r:embed="rId2"/>
                 <a:stretch>
-                  <a:fillRect l="-1043" t="-2241" r="-1449"/>
+                  <a:fillRect l="-754" t="-1961"/>
                 </a:stretch>
               </a:blipFill>
             </p:spPr>
@@ -5560,8 +5623,8 @@
         </p:blipFill>
         <p:spPr>
           <a:xfrm>
-            <a:off x="89062" y="3903281"/>
-            <a:ext cx="5971428" cy="2911241"/>
+            <a:off x="309373" y="3661840"/>
+            <a:ext cx="5752021" cy="2804274"/>
           </a:xfrm>
           <a:prstGeom prst="rect">
             <a:avLst/>
@@ -5590,8 +5653,8 @@
         </p:blipFill>
         <p:spPr>
           <a:xfrm>
-            <a:off x="6131512" y="3780650"/>
-            <a:ext cx="6122528" cy="3033871"/>
+            <a:off x="5965371" y="3661840"/>
+            <a:ext cx="6118752" cy="3032000"/>
           </a:xfrm>
           <a:prstGeom prst="rect">
             <a:avLst/>

</xml_diff>